<commit_message>
code and presentation ppt
</commit_message>
<xml_diff>
--- a/Presentation.pptx
+++ b/Presentation.pptx
@@ -149,6 +149,7 @@
           <a:p>
             <a:fld id="{7C9D82D3-A0CA-4097-87E9-C6E6E7435203}" type="datetimeFigureOut">
               <a:rPr lang="en-US" smtClean="0"/>
+              <a:pPr/>
               <a:t>9/2/2021</a:t>
             </a:fld>
             <a:endParaRPr lang="en-US"/>
@@ -195,6 +196,7 @@
           <a:p>
             <a:fld id="{3DF881C2-8410-4D1E-8A2F-DF82D2EB40D3}" type="slidenum">
               <a:rPr lang="en-US" smtClean="0"/>
+              <a:pPr/>
               <a:t>‹#›</a:t>
             </a:fld>
             <a:endParaRPr lang="en-US"/>
@@ -866,6 +868,7 @@
           <a:p>
             <a:fld id="{7C9D82D3-A0CA-4097-87E9-C6E6E7435203}" type="datetimeFigureOut">
               <a:rPr lang="en-US" smtClean="0"/>
+              <a:pPr/>
               <a:t>9/2/2021</a:t>
             </a:fld>
             <a:endParaRPr lang="en-US"/>
@@ -912,6 +915,7 @@
           <a:p>
             <a:fld id="{3DF881C2-8410-4D1E-8A2F-DF82D2EB40D3}" type="slidenum">
               <a:rPr lang="en-US" smtClean="0"/>
+              <a:pPr/>
               <a:t>‹#›</a:t>
             </a:fld>
             <a:endParaRPr lang="en-US"/>
@@ -1051,6 +1055,7 @@
           <a:p>
             <a:fld id="{7C9D82D3-A0CA-4097-87E9-C6E6E7435203}" type="datetimeFigureOut">
               <a:rPr lang="en-US" smtClean="0"/>
+              <a:pPr/>
               <a:t>9/2/2021</a:t>
             </a:fld>
             <a:endParaRPr lang="en-US"/>
@@ -1097,6 +1102,7 @@
           <a:p>
             <a:fld id="{3DF881C2-8410-4D1E-8A2F-DF82D2EB40D3}" type="slidenum">
               <a:rPr lang="en-US" smtClean="0"/>
+              <a:pPr/>
               <a:t>‹#›</a:t>
             </a:fld>
             <a:endParaRPr lang="en-US"/>
@@ -1226,6 +1232,7 @@
           <a:p>
             <a:fld id="{7C9D82D3-A0CA-4097-87E9-C6E6E7435203}" type="datetimeFigureOut">
               <a:rPr lang="en-US" smtClean="0"/>
+              <a:pPr/>
               <a:t>9/2/2021</a:t>
             </a:fld>
             <a:endParaRPr lang="en-US"/>
@@ -1272,6 +1279,7 @@
           <a:p>
             <a:fld id="{3DF881C2-8410-4D1E-8A2F-DF82D2EB40D3}" type="slidenum">
               <a:rPr lang="en-US" smtClean="0"/>
+              <a:pPr/>
               <a:t>‹#›</a:t>
             </a:fld>
             <a:endParaRPr lang="en-US"/>
@@ -2709,6 +2717,7 @@
           <a:p>
             <a:fld id="{7C9D82D3-A0CA-4097-87E9-C6E6E7435203}" type="datetimeFigureOut">
               <a:rPr lang="en-US" smtClean="0"/>
+              <a:pPr/>
               <a:t>9/2/2021</a:t>
             </a:fld>
             <a:endParaRPr lang="en-US"/>
@@ -2755,6 +2764,7 @@
           <a:p>
             <a:fld id="{3DF881C2-8410-4D1E-8A2F-DF82D2EB40D3}" type="slidenum">
               <a:rPr lang="en-US" smtClean="0"/>
+              <a:pPr/>
               <a:t>‹#›</a:t>
             </a:fld>
             <a:endParaRPr lang="en-US"/>
@@ -3309,6 +3319,7 @@
           <a:p>
             <a:fld id="{7C9D82D3-A0CA-4097-87E9-C6E6E7435203}" type="datetimeFigureOut">
               <a:rPr lang="en-US" smtClean="0"/>
+              <a:pPr/>
               <a:t>9/2/2021</a:t>
             </a:fld>
             <a:endParaRPr lang="en-US"/>
@@ -3355,6 +3366,7 @@
           <a:p>
             <a:fld id="{3DF881C2-8410-4D1E-8A2F-DF82D2EB40D3}" type="slidenum">
               <a:rPr lang="en-US" smtClean="0"/>
+              <a:pPr/>
               <a:t>‹#›</a:t>
             </a:fld>
             <a:endParaRPr lang="en-US"/>
@@ -3746,6 +3758,7 @@
           <a:p>
             <a:fld id="{7C9D82D3-A0CA-4097-87E9-C6E6E7435203}" type="datetimeFigureOut">
               <a:rPr lang="en-US" smtClean="0"/>
+              <a:pPr/>
               <a:t>9/2/2021</a:t>
             </a:fld>
             <a:endParaRPr lang="en-US"/>
@@ -3792,6 +3805,7 @@
           <a:p>
             <a:fld id="{3DF881C2-8410-4D1E-8A2F-DF82D2EB40D3}" type="slidenum">
               <a:rPr lang="en-US" smtClean="0"/>
+              <a:pPr/>
               <a:t>‹#›</a:t>
             </a:fld>
             <a:endParaRPr lang="en-US"/>
@@ -4307,6 +4321,7 @@
           <a:p>
             <a:fld id="{7C9D82D3-A0CA-4097-87E9-C6E6E7435203}" type="datetimeFigureOut">
               <a:rPr lang="en-US" smtClean="0"/>
+              <a:pPr/>
               <a:t>9/2/2021</a:t>
             </a:fld>
             <a:endParaRPr lang="en-US"/>
@@ -4353,6 +4368,7 @@
           <a:p>
             <a:fld id="{3DF881C2-8410-4D1E-8A2F-DF82D2EB40D3}" type="slidenum">
               <a:rPr lang="en-US" smtClean="0"/>
+              <a:pPr/>
               <a:t>‹#›</a:t>
             </a:fld>
             <a:endParaRPr lang="en-US"/>
@@ -4403,6 +4419,7 @@
           <a:p>
             <a:fld id="{7C9D82D3-A0CA-4097-87E9-C6E6E7435203}" type="datetimeFigureOut">
               <a:rPr lang="en-US" smtClean="0"/>
+              <a:pPr/>
               <a:t>9/2/2021</a:t>
             </a:fld>
             <a:endParaRPr lang="en-US"/>
@@ -4449,6 +4466,7 @@
           <a:p>
             <a:fld id="{3DF881C2-8410-4D1E-8A2F-DF82D2EB40D3}" type="slidenum">
               <a:rPr lang="en-US" smtClean="0"/>
+              <a:pPr/>
               <a:t>‹#›</a:t>
             </a:fld>
             <a:endParaRPr lang="en-US"/>
@@ -4657,6 +4675,7 @@
           <a:p>
             <a:fld id="{7C9D82D3-A0CA-4097-87E9-C6E6E7435203}" type="datetimeFigureOut">
               <a:rPr lang="en-US" smtClean="0"/>
+              <a:pPr/>
               <a:t>9/2/2021</a:t>
             </a:fld>
             <a:endParaRPr lang="en-US"/>
@@ -4703,6 +4722,7 @@
           <a:p>
             <a:fld id="{3DF881C2-8410-4D1E-8A2F-DF82D2EB40D3}" type="slidenum">
               <a:rPr lang="en-US" smtClean="0"/>
+              <a:pPr/>
               <a:t>‹#›</a:t>
             </a:fld>
             <a:endParaRPr lang="en-US"/>
@@ -5378,6 +5398,7 @@
           <a:p>
             <a:fld id="{7C9D82D3-A0CA-4097-87E9-C6E6E7435203}" type="datetimeFigureOut">
               <a:rPr lang="en-US" smtClean="0"/>
+              <a:pPr/>
               <a:t>9/2/2021</a:t>
             </a:fld>
             <a:endParaRPr lang="en-US"/>
@@ -5434,6 +5455,7 @@
           <a:p>
             <a:fld id="{3DF881C2-8410-4D1E-8A2F-DF82D2EB40D3}" type="slidenum">
               <a:rPr lang="en-US" smtClean="0"/>
+              <a:pPr/>
               <a:t>‹#›</a:t>
             </a:fld>
             <a:endParaRPr lang="en-US"/>
@@ -6051,6 +6073,7 @@
           <a:p>
             <a:fld id="{7C9D82D3-A0CA-4097-87E9-C6E6E7435203}" type="datetimeFigureOut">
               <a:rPr lang="en-US" smtClean="0"/>
+              <a:pPr/>
               <a:t>9/2/2021</a:t>
             </a:fld>
             <a:endParaRPr lang="en-US"/>
@@ -6127,6 +6150,7 @@
           <a:p>
             <a:fld id="{3DF881C2-8410-4D1E-8A2F-DF82D2EB40D3}" type="slidenum">
               <a:rPr lang="en-US" smtClean="0"/>
+              <a:pPr/>
               <a:t>‹#›</a:t>
             </a:fld>
             <a:endParaRPr lang="en-US"/>
@@ -6500,22 +6524,16 @@
           <a:lstStyle/>
           <a:p>
             <a:r>
-              <a:rPr lang="en-US" sz="3200" dirty="0" smtClean="0">
+              <a:rPr lang="en-US" sz="3200" smtClean="0">
                 <a:latin typeface="Agency FB" pitchFamily="34" charset="0"/>
               </a:rPr>
               <a:t>Ebenezer </a:t>
             </a:r>
             <a:r>
-              <a:rPr lang="en-US" sz="3200" dirty="0" err="1" smtClean="0">
+              <a:rPr lang="en-US" sz="3200" smtClean="0">
                 <a:latin typeface="Agency FB" pitchFamily="34" charset="0"/>
               </a:rPr>
-              <a:t>Issac</a:t>
-            </a:r>
-            <a:r>
-              <a:rPr lang="en-US" sz="3200" dirty="0" smtClean="0">
-                <a:latin typeface="Agency FB" pitchFamily="34" charset="0"/>
-              </a:rPr>
-              <a:t> </a:t>
+              <a:t>Isaac </a:t>
             </a:r>
             <a:r>
               <a:rPr lang="en-US" sz="3200" dirty="0" err="1" smtClean="0">
@@ -6758,7 +6776,19 @@
               <a:rPr lang="en-US" dirty="0">
                 <a:latin typeface="Agency FB" pitchFamily="34" charset="0"/>
               </a:rPr>
-              <a:t>of objects of a </a:t>
+              <a:t>of objects </a:t>
+            </a:r>
+            <a:r>
+              <a:rPr lang="en-US" dirty="0" smtClean="0">
+                <a:latin typeface="Agency FB" pitchFamily="34" charset="0"/>
+              </a:rPr>
+              <a:t>on </a:t>
+            </a:r>
+            <a:r>
+              <a:rPr lang="en-US" dirty="0">
+                <a:latin typeface="Agency FB" pitchFamily="34" charset="0"/>
+              </a:rPr>
+              <a:t>a </a:t>
             </a:r>
             <a:r>
               <a:rPr lang="en-US" dirty="0" smtClean="0">
@@ -7244,31 +7274,38 @@
           <a:p>
             <a:r>
               <a:rPr lang="en-US" dirty="0" smtClean="0"/>
-              <a:t>Code</a:t>
+              <a:t>Screenshots</a:t>
             </a:r>
             <a:endParaRPr lang="en-US" dirty="0"/>
           </a:p>
         </p:txBody>
       </p:sp>
-      <p:sp>
-        <p:nvSpPr>
-          <p:cNvPr id="3" name="Content Placeholder 2"/>
-          <p:cNvSpPr>
-            <a:spLocks noGrp="1"/>
-          </p:cNvSpPr>
-          <p:nvPr>
-            <p:ph idx="1"/>
-          </p:nvPr>
-        </p:nvSpPr>
-        <p:spPr/>
-        <p:txBody>
-          <a:bodyPr/>
-          <a:lstStyle/>
-          <a:p>
-            <a:endParaRPr lang="en-US"/>
-          </a:p>
-        </p:txBody>
-      </p:sp>
+      <p:pic>
+        <p:nvPicPr>
+          <p:cNvPr id="1026" name="Picture 2" descr="1*IrptRDRG8IL9o-55BKjbLA.png (739×532)"/>
+          <p:cNvPicPr>
+            <a:picLocks noChangeAspect="1" noChangeArrowheads="1"/>
+          </p:cNvPicPr>
+          <p:nvPr/>
+        </p:nvPicPr>
+        <p:blipFill>
+          <a:blip r:embed="rId2"/>
+          <a:srcRect/>
+          <a:stretch>
+            <a:fillRect/>
+          </a:stretch>
+        </p:blipFill>
+        <p:spPr bwMode="auto">
+          <a:xfrm>
+            <a:off x="1000100" y="1428736"/>
+            <a:ext cx="7038975" cy="5067301"/>
+          </a:xfrm>
+          <a:prstGeom prst="rect">
+            <a:avLst/>
+          </a:prstGeom>
+          <a:noFill/>
+        </p:spPr>
+      </p:pic>
     </p:spTree>
   </p:cSld>
   <p:clrMapOvr>

</xml_diff>